<commit_message>
updated stats and added middle line to separate subjects
</commit_message>
<xml_diff>
--- a/AAS 2017/Alphapower_Poster_v2.pptx
+++ b/AAS 2017/Alphapower_Poster_v2.pptx
@@ -5041,7 +5041,7 @@
         </p:nvSpPr>
         <p:spPr>
           <a:xfrm>
-            <a:off x="30715384" y="5851467"/>
+            <a:off x="30669664" y="5913120"/>
             <a:ext cx="12801600" cy="1219200"/>
           </a:xfrm>
         </p:spPr>
@@ -6175,7 +6175,7 @@
           <p:nvPr>
             <p:extLst>
               <p:ext uri="{D42A27DB-BD31-4B8C-83A1-F6EECF244321}">
-                <p14:modId xmlns:p14="http://schemas.microsoft.com/office/powerpoint/2010/main" val="1589880495"/>
+                <p14:modId xmlns:p14="http://schemas.microsoft.com/office/powerpoint/2010/main" val="1014178975"/>
               </p:ext>
             </p:extLst>
           </p:nvPr>
@@ -6194,28 +6194,28 @@
                 <a:gridCol w="3174075">
                   <a:extLst>
                     <a:ext uri="{9D8B030D-6E8A-4147-A177-3AD203B41FA5}">
-                      <a16:colId xmlns:a16="http://schemas.microsoft.com/office/drawing/2014/main" val="3632308337"/>
+                      <a16:colId xmlns:a16="http://schemas.microsoft.com/office/drawing/2014/main" xmlns="" val="3632308337"/>
                     </a:ext>
                   </a:extLst>
                 </a:gridCol>
                 <a:gridCol w="3174075">
                   <a:extLst>
                     <a:ext uri="{9D8B030D-6E8A-4147-A177-3AD203B41FA5}">
-                      <a16:colId xmlns:a16="http://schemas.microsoft.com/office/drawing/2014/main" val="3161482999"/>
+                      <a16:colId xmlns:a16="http://schemas.microsoft.com/office/drawing/2014/main" xmlns="" val="3161482999"/>
                     </a:ext>
                   </a:extLst>
                 </a:gridCol>
                 <a:gridCol w="3174075">
                   <a:extLst>
                     <a:ext uri="{9D8B030D-6E8A-4147-A177-3AD203B41FA5}">
-                      <a16:colId xmlns:a16="http://schemas.microsoft.com/office/drawing/2014/main" val="1464763851"/>
+                      <a16:colId xmlns:a16="http://schemas.microsoft.com/office/drawing/2014/main" xmlns="" val="1464763851"/>
                     </a:ext>
                   </a:extLst>
                 </a:gridCol>
                 <a:gridCol w="3174075">
                   <a:extLst>
                     <a:ext uri="{9D8B030D-6E8A-4147-A177-3AD203B41FA5}">
-                      <a16:colId xmlns:a16="http://schemas.microsoft.com/office/drawing/2014/main" val="1517804166"/>
+                      <a16:colId xmlns:a16="http://schemas.microsoft.com/office/drawing/2014/main" xmlns="" val="1517804166"/>
                     </a:ext>
                   </a:extLst>
                 </a:gridCol>
@@ -6292,7 +6292,7 @@
                 </a:tc>
                 <a:extLst>
                   <a:ext uri="{0D108BD9-81ED-4DB2-BD59-A6C34878D82A}">
-                    <a16:rowId xmlns:a16="http://schemas.microsoft.com/office/drawing/2014/main" val="559417239"/>
+                    <a16:rowId xmlns:a16="http://schemas.microsoft.com/office/drawing/2014/main" xmlns="" val="559417239"/>
                   </a:ext>
                 </a:extLst>
               </a:tr>
@@ -6319,8 +6319,13 @@
                       <a:pPr algn="ctr"/>
                       <a:r>
                         <a:rPr lang="en-US" sz="4000" dirty="0"/>
-                        <a:t>-39.7</a:t>
+                        <a:t>-</a:t>
                       </a:r>
+                      <a:r>
+                        <a:rPr lang="en-US" sz="4000" dirty="0" smtClean="0"/>
+                        <a:t>30.6</a:t>
+                      </a:r>
+                      <a:endParaRPr lang="en-US" sz="4000" dirty="0"/>
                     </a:p>
                   </a:txBody>
                   <a:tcPr marL="39676" marR="39676" marT="19838" marB="19838"/>
@@ -6332,9 +6337,10 @@
                     <a:p>
                       <a:pPr algn="ctr"/>
                       <a:r>
-                        <a:rPr lang="en-US" sz="4000" dirty="0"/>
-                        <a:t>12.6</a:t>
+                        <a:rPr lang="en-US" sz="4000" dirty="0" smtClean="0"/>
+                        <a:t>8.4</a:t>
                       </a:r>
+                      <a:endParaRPr lang="en-US" sz="4000" dirty="0"/>
                     </a:p>
                   </a:txBody>
                   <a:tcPr marL="39676" marR="39676" marT="19838" marB="19838"/>
@@ -6346,16 +6352,17 @@
                     <a:p>
                       <a:pPr algn="ctr"/>
                       <a:r>
-                        <a:rPr lang="en-US" sz="4000" dirty="0"/>
-                        <a:t>0.008**</a:t>
+                        <a:rPr lang="en-US" sz="4000" dirty="0" smtClean="0"/>
+                        <a:t>0.003**</a:t>
                       </a:r>
+                      <a:endParaRPr lang="en-US" sz="4000" dirty="0"/>
                     </a:p>
                   </a:txBody>
                   <a:tcPr marL="39676" marR="39676" marT="19838" marB="19838"/>
                 </a:tc>
                 <a:extLst>
                   <a:ext uri="{0D108BD9-81ED-4DB2-BD59-A6C34878D82A}">
-                    <a16:rowId xmlns:a16="http://schemas.microsoft.com/office/drawing/2014/main" val="2181573276"/>
+                    <a16:rowId xmlns:a16="http://schemas.microsoft.com/office/drawing/2014/main" xmlns="" val="2181573276"/>
                   </a:ext>
                 </a:extLst>
               </a:tr>
@@ -6381,9 +6388,10 @@
                     <a:p>
                       <a:pPr algn="ctr"/>
                       <a:r>
-                        <a:rPr lang="en-US" sz="4000" dirty="0"/>
-                        <a:t>19.0</a:t>
+                        <a:rPr lang="en-US" sz="4000" dirty="0" smtClean="0"/>
+                        <a:t>11.8</a:t>
                       </a:r>
+                      <a:endParaRPr lang="en-US" sz="4000" dirty="0"/>
                     </a:p>
                   </a:txBody>
                   <a:tcPr marL="39676" marR="39676" marT="19838" marB="19838"/>
@@ -6395,9 +6403,10 @@
                     <a:p>
                       <a:pPr algn="ctr"/>
                       <a:r>
-                        <a:rPr lang="en-US" sz="4000" dirty="0"/>
-                        <a:t>6.4</a:t>
+                        <a:rPr lang="en-US" sz="4000" dirty="0" smtClean="0"/>
+                        <a:t>4.2</a:t>
                       </a:r>
+                      <a:endParaRPr lang="en-US" sz="4000" dirty="0"/>
                     </a:p>
                   </a:txBody>
                   <a:tcPr marL="39676" marR="39676" marT="19838" marB="19838"/>
@@ -6409,16 +6418,17 @@
                     <a:p>
                       <a:pPr algn="ctr"/>
                       <a:r>
-                        <a:rPr lang="en-US" sz="4000" dirty="0"/>
-                        <a:t>0.01*</a:t>
+                        <a:rPr lang="en-US" sz="4000" dirty="0" smtClean="0"/>
+                        <a:t>0.02*</a:t>
                       </a:r>
+                      <a:endParaRPr lang="en-US" sz="4000" dirty="0"/>
                     </a:p>
                   </a:txBody>
                   <a:tcPr marL="39676" marR="39676" marT="19838" marB="19838"/>
                 </a:tc>
                 <a:extLst>
                   <a:ext uri="{0D108BD9-81ED-4DB2-BD59-A6C34878D82A}">
-                    <a16:rowId xmlns:a16="http://schemas.microsoft.com/office/drawing/2014/main" val="1041974949"/>
+                    <a16:rowId xmlns:a16="http://schemas.microsoft.com/office/drawing/2014/main" xmlns="" val="1041974949"/>
                   </a:ext>
                 </a:extLst>
               </a:tr>
@@ -6814,7 +6824,7 @@
         </p:nvSpPr>
         <p:spPr>
           <a:xfrm>
-            <a:off x="20482560" y="25463779"/>
+            <a:off x="20482560" y="25292329"/>
             <a:ext cx="4498209" cy="577290"/>
           </a:xfrm>
         </p:spPr>
@@ -7255,6 +7265,191 @@
           </p:spPr>
         </p:pic>
       </p:grpSp>
+      <p:cxnSp>
+        <p:nvCxnSpPr>
+          <p:cNvPr id="26" name="Straight Connector 25"/>
+          <p:cNvCxnSpPr/>
+          <p:nvPr/>
+        </p:nvCxnSpPr>
+        <p:spPr>
+          <a:xfrm>
+            <a:off x="22827062" y="9306731"/>
+            <a:ext cx="0" cy="4929592"/>
+          </a:xfrm>
+          <a:prstGeom prst="line">
+            <a:avLst/>
+          </a:prstGeom>
+          <a:ln w="50800">
+            <a:solidFill>
+              <a:srgbClr val="030206">
+                <a:alpha val="52941"/>
+              </a:srgbClr>
+            </a:solidFill>
+          </a:ln>
+        </p:spPr>
+        <p:style>
+          <a:lnRef idx="1">
+            <a:schemeClr val="accent1"/>
+          </a:lnRef>
+          <a:fillRef idx="0">
+            <a:schemeClr val="accent1"/>
+          </a:fillRef>
+          <a:effectRef idx="0">
+            <a:schemeClr val="accent1"/>
+          </a:effectRef>
+          <a:fontRef idx="minor">
+            <a:schemeClr val="tx1"/>
+          </a:fontRef>
+        </p:style>
+      </p:cxnSp>
+      <p:cxnSp>
+        <p:nvCxnSpPr>
+          <p:cNvPr id="98" name="Straight Connector 97"/>
+          <p:cNvCxnSpPr/>
+          <p:nvPr/>
+        </p:nvCxnSpPr>
+        <p:spPr>
+          <a:xfrm>
+            <a:off x="22885772" y="16415806"/>
+            <a:ext cx="0" cy="3227501"/>
+          </a:xfrm>
+          <a:prstGeom prst="line">
+            <a:avLst/>
+          </a:prstGeom>
+          <a:ln w="50800">
+            <a:solidFill>
+              <a:srgbClr val="030206">
+                <a:alpha val="52941"/>
+              </a:srgbClr>
+            </a:solidFill>
+          </a:ln>
+        </p:spPr>
+        <p:style>
+          <a:lnRef idx="1">
+            <a:schemeClr val="accent1"/>
+          </a:lnRef>
+          <a:fillRef idx="0">
+            <a:schemeClr val="accent1"/>
+          </a:fillRef>
+          <a:effectRef idx="0">
+            <a:schemeClr val="accent1"/>
+          </a:effectRef>
+          <a:fontRef idx="minor">
+            <a:schemeClr val="tx1"/>
+          </a:fontRef>
+        </p:style>
+      </p:cxnSp>
+      <p:cxnSp>
+        <p:nvCxnSpPr>
+          <p:cNvPr id="100" name="Straight Connector 99"/>
+          <p:cNvCxnSpPr/>
+          <p:nvPr/>
+        </p:nvCxnSpPr>
+        <p:spPr>
+          <a:xfrm>
+            <a:off x="22885772" y="20503639"/>
+            <a:ext cx="0" cy="3227501"/>
+          </a:xfrm>
+          <a:prstGeom prst="line">
+            <a:avLst/>
+          </a:prstGeom>
+          <a:ln w="50800">
+            <a:solidFill>
+              <a:srgbClr val="030206">
+                <a:alpha val="52941"/>
+              </a:srgbClr>
+            </a:solidFill>
+          </a:ln>
+        </p:spPr>
+        <p:style>
+          <a:lnRef idx="1">
+            <a:schemeClr val="accent1"/>
+          </a:lnRef>
+          <a:fillRef idx="0">
+            <a:schemeClr val="accent1"/>
+          </a:fillRef>
+          <a:effectRef idx="0">
+            <a:schemeClr val="accent1"/>
+          </a:effectRef>
+          <a:fontRef idx="minor">
+            <a:schemeClr val="tx1"/>
+          </a:fontRef>
+        </p:style>
+      </p:cxnSp>
+      <p:cxnSp>
+        <p:nvCxnSpPr>
+          <p:cNvPr id="102" name="Straight Connector 101"/>
+          <p:cNvCxnSpPr/>
+          <p:nvPr/>
+        </p:nvCxnSpPr>
+        <p:spPr>
+          <a:xfrm>
+            <a:off x="22919870" y="25836689"/>
+            <a:ext cx="4002" cy="2399409"/>
+          </a:xfrm>
+          <a:prstGeom prst="line">
+            <a:avLst/>
+          </a:prstGeom>
+          <a:ln w="50800">
+            <a:solidFill>
+              <a:srgbClr val="030206">
+                <a:alpha val="52941"/>
+              </a:srgbClr>
+            </a:solidFill>
+          </a:ln>
+        </p:spPr>
+        <p:style>
+          <a:lnRef idx="1">
+            <a:schemeClr val="accent1"/>
+          </a:lnRef>
+          <a:fillRef idx="0">
+            <a:schemeClr val="accent1"/>
+          </a:fillRef>
+          <a:effectRef idx="0">
+            <a:schemeClr val="accent1"/>
+          </a:effectRef>
+          <a:fontRef idx="minor">
+            <a:schemeClr val="tx1"/>
+          </a:fontRef>
+        </p:style>
+      </p:cxnSp>
+      <p:cxnSp>
+        <p:nvCxnSpPr>
+          <p:cNvPr id="106" name="Straight Connector 105"/>
+          <p:cNvCxnSpPr/>
+          <p:nvPr/>
+        </p:nvCxnSpPr>
+        <p:spPr>
+          <a:xfrm>
+            <a:off x="22916958" y="28929349"/>
+            <a:ext cx="0" cy="2039253"/>
+          </a:xfrm>
+          <a:prstGeom prst="line">
+            <a:avLst/>
+          </a:prstGeom>
+          <a:ln w="50800">
+            <a:solidFill>
+              <a:srgbClr val="030206">
+                <a:alpha val="52941"/>
+              </a:srgbClr>
+            </a:solidFill>
+          </a:ln>
+        </p:spPr>
+        <p:style>
+          <a:lnRef idx="1">
+            <a:schemeClr val="accent1"/>
+          </a:lnRef>
+          <a:fillRef idx="0">
+            <a:schemeClr val="accent1"/>
+          </a:fillRef>
+          <a:effectRef idx="0">
+            <a:schemeClr val="accent1"/>
+          </a:effectRef>
+          <a:fontRef idx="minor">
+            <a:schemeClr val="tx1"/>
+          </a:fontRef>
+        </p:style>
+      </p:cxnSp>
     </p:spTree>
     <p:extLst>
       <p:ext uri="{BB962C8B-B14F-4D97-AF65-F5344CB8AC3E}">

</xml_diff>